<commit_message>
Update Climate Change project update week 3 copy simon.pptx
</commit_message>
<xml_diff>
--- a/Presentations/Climate Change project update week 3 copy simon.pptx
+++ b/Presentations/Climate Change project update week 3 copy simon.pptx
@@ -273,7 +273,7 @@
       <p15:sldGuideLst xmlns:p15="http://schemas.microsoft.com/office/powerpoint/2012/main"/>
     </p:ext>
     <p:ext uri="http://customooxmlschemas.google.com/">
-      <go:slidesCustomData xmlns:go="http://customooxmlschemas.google.com/" xmlns:p15="http://schemas.microsoft.com/office/powerpoint/2012/main" xmlns:p14="http://schemas.microsoft.com/office/powerpoint/2010/main" xmlns:com="http://schemas.openxmlformats.org/drawingml/2006/compatibility" xmlns:pvml="urn:schemas-microsoft-com:office:powerpoint" xmlns:v="urn:schemas-microsoft-com:vml" xmlns:o="urn:schemas-microsoft-com:office:office" xmlns:dgm="http://schemas.openxmlformats.org/drawingml/2006/diagram" xmlns:c="http://schemas.openxmlformats.org/drawingml/2006/chart" xmlns:mv="urn:schemas-microsoft-com:mac:vml" xmlns:mc="http://schemas.openxmlformats.org/markup-compatibility/2006" xmlns="" r:id="rId26" roundtripDataSignature="AMtx7mgUs7OCuu4njwz6q0A3s4QfhZ5RLA=="/>
+      <go:slidesCustomData xmlns="" xmlns:mc="http://schemas.openxmlformats.org/markup-compatibility/2006" xmlns:mv="urn:schemas-microsoft-com:mac:vml" xmlns:c="http://schemas.openxmlformats.org/drawingml/2006/chart" xmlns:dgm="http://schemas.openxmlformats.org/drawingml/2006/diagram" xmlns:o="urn:schemas-microsoft-com:office:office" xmlns:v="urn:schemas-microsoft-com:vml" xmlns:pvml="urn:schemas-microsoft-com:office:powerpoint" xmlns:com="http://schemas.openxmlformats.org/drawingml/2006/compatibility" xmlns:p14="http://schemas.microsoft.com/office/powerpoint/2010/main" xmlns:p15="http://schemas.microsoft.com/office/powerpoint/2012/main" xmlns:go="http://customooxmlschemas.google.com/" r:id="rId26" roundtripDataSignature="AMtx7mgUs7OCuu4njwz6q0A3s4QfhZ5RLA=="/>
     </p:ext>
   </p:extLst>
 </p:presentation>
@@ -19036,10 +19036,10 @@
               <a:buChar char="●"/>
             </a:pPr>
             <a:r>
-              <a:rPr lang="nl-NL"/>
+              <a:rPr lang="nl-NL" dirty="0"/>
               <a:t>To do: Generalize this to different models and compare performances as well as to play around with the training set size (e.g. only having the first 100 days poses a bigger challenge since the network never gets to see certain months)</a:t>
             </a:r>
-            <a:endParaRPr/>
+            <a:endParaRPr dirty="0"/>
           </a:p>
           <a:p>
             <a:pPr marL="457200" lvl="0" indent="-342900" algn="l" rtl="0">
@@ -19056,10 +19056,10 @@
               <a:buChar char="●"/>
             </a:pPr>
             <a:r>
-              <a:rPr lang="nl-NL"/>
+              <a:rPr lang="nl-NL" dirty="0"/>
               <a:t>Questions that arise here: How to make the task more challenging? What other predictions could be useful in this context?</a:t>
             </a:r>
-            <a:endParaRPr/>
+            <a:endParaRPr dirty="0"/>
           </a:p>
         </p:txBody>
       </p:sp>
@@ -21367,7 +21367,7 @@
                   <a:srgbClr val="FFFFFF"/>
                 </a:solidFill>
               </a:rPr>
-              <a:t>2 Clusters</a:t>
+              <a:t>3 Clusters</a:t>
             </a:r>
           </a:p>
         </p:txBody>

</xml_diff>